<commit_message>
day 63, 64, 65
</commit_message>
<xml_diff>
--- a/2nd Semester/MathAnalysis_Day_061 Continue Project, Develop Plan (Day 11).pptx
+++ b/2nd Semester/MathAnalysis_Day_061 Continue Project, Develop Plan (Day 11).pptx
@@ -203,7 +203,7 @@
           <a:p>
             <a:fld id="{0090E0ED-51A2-4D0E-BDCF-E17571396CEC}" type="datetimeFigureOut">
               <a:rPr lang="en-US" smtClean="0"/>
-              <a:t>3/20/2018</a:t>
+              <a:t>3/28/2018</a:t>
             </a:fld>
             <a:endParaRPr lang="en-US"/>
           </a:p>
@@ -456,7 +456,7 @@
             <a:fld id="{87DE6118-2437-4B30-8E3C-4D2BE6020583}" type="datetimeFigureOut">
               <a:rPr lang="en-US" dirty="0"/>
               <a:pPr/>
-              <a:t>3/20/2018</a:t>
+              <a:t>3/28/2018</a:t>
             </a:fld>
             <a:endParaRPr lang="en-US" dirty="0"/>
           </a:p>
@@ -782,7 +782,7 @@
           <a:p>
             <a:fld id="{87DE6118-2437-4B30-8E3C-4D2BE6020583}" type="datetimeFigureOut">
               <a:rPr lang="en-US" dirty="0"/>
-              <a:t>3/20/2018</a:t>
+              <a:t>3/28/2018</a:t>
             </a:fld>
             <a:endParaRPr lang="en-US" dirty="0"/>
           </a:p>
@@ -957,7 +957,7 @@
           <a:p>
             <a:fld id="{87DE6118-2437-4B30-8E3C-4D2BE6020583}" type="datetimeFigureOut">
               <a:rPr lang="en-US" dirty="0"/>
-              <a:t>3/20/2018</a:t>
+              <a:t>3/28/2018</a:t>
             </a:fld>
             <a:endParaRPr lang="en-US" dirty="0"/>
           </a:p>
@@ -1122,7 +1122,7 @@
           <a:p>
             <a:fld id="{87DE6118-2437-4B30-8E3C-4D2BE6020583}" type="datetimeFigureOut">
               <a:rPr lang="en-US" dirty="0"/>
-              <a:t>3/20/2018</a:t>
+              <a:t>3/28/2018</a:t>
             </a:fld>
             <a:endParaRPr lang="en-US" dirty="0"/>
           </a:p>
@@ -1395,7 +1395,7 @@
             <a:fld id="{87DE6118-2437-4B30-8E3C-4D2BE6020583}" type="datetimeFigureOut">
               <a:rPr lang="en-US" dirty="0"/>
               <a:pPr/>
-              <a:t>3/20/2018</a:t>
+              <a:t>3/28/2018</a:t>
             </a:fld>
             <a:endParaRPr lang="en-US" dirty="0"/>
           </a:p>
@@ -1785,7 +1785,7 @@
           <a:p>
             <a:fld id="{87DE6118-2437-4B30-8E3C-4D2BE6020583}" type="datetimeFigureOut">
               <a:rPr lang="en-US" dirty="0"/>
-              <a:t>3/20/2018</a:t>
+              <a:t>3/28/2018</a:t>
             </a:fld>
             <a:endParaRPr lang="en-US" dirty="0"/>
           </a:p>
@@ -2257,7 +2257,7 @@
           <a:p>
             <a:fld id="{87DE6118-2437-4B30-8E3C-4D2BE6020583}" type="datetimeFigureOut">
               <a:rPr lang="en-US" dirty="0"/>
-              <a:t>3/20/2018</a:t>
+              <a:t>3/28/2018</a:t>
             </a:fld>
             <a:endParaRPr lang="en-US" dirty="0"/>
           </a:p>
@@ -2370,7 +2370,7 @@
           <a:p>
             <a:fld id="{87DE6118-2437-4B30-8E3C-4D2BE6020583}" type="datetimeFigureOut">
               <a:rPr lang="en-US" dirty="0"/>
-              <a:t>3/20/2018</a:t>
+              <a:t>3/28/2018</a:t>
             </a:fld>
             <a:endParaRPr lang="en-US" dirty="0"/>
           </a:p>
@@ -2460,7 +2460,7 @@
           <a:p>
             <a:fld id="{87DE6118-2437-4B30-8E3C-4D2BE6020583}" type="datetimeFigureOut">
               <a:rPr lang="en-US" dirty="0"/>
-              <a:t>3/20/2018</a:t>
+              <a:t>3/28/2018</a:t>
             </a:fld>
             <a:endParaRPr lang="en-US" dirty="0"/>
           </a:p>
@@ -2802,7 +2802,7 @@
             <a:fld id="{87DE6118-2437-4B30-8E3C-4D2BE6020583}" type="datetimeFigureOut">
               <a:rPr lang="en-US" dirty="0"/>
               <a:pPr/>
-              <a:t>3/20/2018</a:t>
+              <a:t>3/28/2018</a:t>
             </a:fld>
             <a:endParaRPr lang="en-US" dirty="0"/>
           </a:p>
@@ -3187,7 +3187,7 @@
             <a:fld id="{87DE6118-2437-4B30-8E3C-4D2BE6020583}" type="datetimeFigureOut">
               <a:rPr lang="en-US" dirty="0"/>
               <a:pPr/>
-              <a:t>3/20/2018</a:t>
+              <a:t>3/28/2018</a:t>
             </a:fld>
             <a:endParaRPr lang="en-US" dirty="0"/>
           </a:p>
@@ -3462,7 +3462,7 @@
             <a:fld id="{87DE6118-2437-4B30-8E3C-4D2BE6020583}" type="datetimeFigureOut">
               <a:rPr lang="en-US" dirty="0"/>
               <a:pPr/>
-              <a:t>3/20/2018</a:t>
+              <a:t>3/28/2018</a:t>
             </a:fld>
             <a:endParaRPr lang="en-US" dirty="0"/>
           </a:p>
@@ -4010,11 +4010,7 @@
           <a:p>
             <a:r>
               <a:rPr lang="en-US" dirty="0" smtClean="0"/>
-              <a:t>Day </a:t>
-            </a:r>
-            <a:r>
-              <a:rPr lang="en-US" dirty="0" smtClean="0"/>
-              <a:t>61</a:t>
+              <a:t>Day 61</a:t>
             </a:r>
             <a:endParaRPr lang="en-US" dirty="0"/>
           </a:p>
@@ -4406,11 +4402,7 @@
           <a:p>
             <a:r>
               <a:rPr lang="en-US" dirty="0" smtClean="0"/>
-              <a:t>Objective/To Do for </a:t>
-            </a:r>
-            <a:r>
-              <a:rPr lang="en-US" dirty="0" smtClean="0"/>
-              <a:t>Today</a:t>
+              <a:t>Objective/To Do for Today</a:t>
             </a:r>
             <a:br>
               <a:rPr lang="en-US" dirty="0" smtClean="0"/>
@@ -4467,8 +4459,16 @@
               <a:buChar char="-"/>
             </a:pPr>
             <a:r>
+              <a:rPr lang="en-US" sz="3400" smtClean="0"/>
+              <a:t>Essentially </a:t>
+            </a:r>
+            <a:r>
+              <a:rPr lang="en-US" sz="3400" smtClean="0"/>
+              <a:t>13 </a:t>
+            </a:r>
+            <a:r>
               <a:rPr lang="en-US" sz="3400" dirty="0" smtClean="0"/>
-              <a:t>Essentially 14 class periods left to complete </a:t>
+              <a:t>class periods left to complete </a:t>
             </a:r>
           </a:p>
           <a:p>
@@ -4480,7 +4480,6 @@
               <a:rPr lang="en-US" sz="3400" dirty="0" smtClean="0"/>
               <a:t>Continue to build</a:t>
             </a:r>
-            <a:endParaRPr lang="en-US" sz="3400" dirty="0" smtClean="0"/>
           </a:p>
         </p:txBody>
       </p:sp>
@@ -4576,15 +4575,7 @@
           <a:p>
             <a:r>
               <a:rPr lang="en-US" sz="3400" b="1" dirty="0" smtClean="0"/>
-              <a:t>Week </a:t>
-            </a:r>
-            <a:r>
-              <a:rPr lang="en-US" sz="3400" b="1" dirty="0" smtClean="0"/>
-              <a:t>6</a:t>
-            </a:r>
-            <a:r>
-              <a:rPr lang="en-US" sz="3400" b="1" dirty="0" smtClean="0"/>
-              <a:t>: </a:t>
+              <a:t>Week 6: </a:t>
             </a:r>
             <a:r>
               <a:rPr lang="en-US" sz="3400" dirty="0" smtClean="0"/>
@@ -4626,7 +4617,6 @@
               <a:rPr lang="en-US" sz="3400" dirty="0" smtClean="0"/>
               <a:t>Touch up the details of your code</a:t>
             </a:r>
-            <a:endParaRPr lang="en-US" sz="3400" dirty="0" smtClean="0"/>
           </a:p>
           <a:p>
             <a:r>
@@ -4635,11 +4625,7 @@
             </a:r>
             <a:r>
               <a:rPr lang="en-US" sz="3400" dirty="0" smtClean="0"/>
-              <a:t>Begin </a:t>
-            </a:r>
-            <a:r>
-              <a:rPr lang="en-US" sz="3400" dirty="0" smtClean="0"/>
-              <a:t>to Put Presentation together</a:t>
+              <a:t>Begin to Put Presentation together</a:t>
             </a:r>
             <a:endParaRPr lang="en-US" sz="3400" dirty="0"/>
           </a:p>

</xml_diff>